<commit_message>
Basic voorbeeld toegevoegd en animatie in buienradarlamp
</commit_message>
<xml_diff>
--- a/doc/IOT for Dummies.pptx
+++ b/doc/IOT for Dummies.pptx
@@ -5,19 +5,20 @@
     <p:sldMasterId id="2147483652" r:id="rId1"/>
   </p:sldMasterIdLst>
   <p:notesMasterIdLst>
-    <p:notesMasterId r:id="rId12"/>
+    <p:notesMasterId r:id="rId13"/>
   </p:notesMasterIdLst>
   <p:sldIdLst>
     <p:sldId id="256" r:id="rId2"/>
     <p:sldId id="257" r:id="rId3"/>
     <p:sldId id="263" r:id="rId4"/>
-    <p:sldId id="258" r:id="rId5"/>
-    <p:sldId id="262" r:id="rId6"/>
-    <p:sldId id="264" r:id="rId7"/>
-    <p:sldId id="265" r:id="rId8"/>
-    <p:sldId id="266" r:id="rId9"/>
-    <p:sldId id="260" r:id="rId10"/>
-    <p:sldId id="261" r:id="rId11"/>
+    <p:sldId id="267" r:id="rId5"/>
+    <p:sldId id="258" r:id="rId6"/>
+    <p:sldId id="262" r:id="rId7"/>
+    <p:sldId id="264" r:id="rId8"/>
+    <p:sldId id="265" r:id="rId9"/>
+    <p:sldId id="266" r:id="rId10"/>
+    <p:sldId id="260" r:id="rId11"/>
+    <p:sldId id="261" r:id="rId12"/>
   </p:sldIdLst>
   <p:sldSz cx="9144000" cy="6858000" type="screen4x3"/>
   <p:notesSz cx="6858000" cy="9144000"/>
@@ -206,7 +207,7 @@
           <a:p>
             <a:fld id="{11A5DEB8-B20E-45CA-81CB-78FFE230F05B}" type="datetimeFigureOut">
               <a:rPr lang="nl-NL" smtClean="0"/>
-              <a:t>16-11-2018</a:t>
+              <a:t>9-12-2018</a:t>
             </a:fld>
             <a:endParaRPr lang="nl-NL"/>
           </a:p>
@@ -5571,18 +5572,6 @@
       </p:grpSpPr>
       <p:sp>
         <p:nvSpPr>
-          <p:cNvPr id="2" name="Tijdelijke aanduiding voor afbeelding 1"/>
-          <p:cNvSpPr>
-            <a:spLocks noGrp="1"/>
-          </p:cNvSpPr>
-          <p:nvPr>
-            <p:ph type="pic" sz="quarter" idx="10"/>
-          </p:nvPr>
-        </p:nvSpPr>
-        <p:spPr/>
-      </p:sp>
-      <p:sp>
-        <p:nvSpPr>
           <p:cNvPr id="3" name="Tijdelijke aanduiding voor tekst 2"/>
           <p:cNvSpPr>
             <a:spLocks noGrp="1"/>
@@ -5630,6 +5619,51 @@
           </a:p>
         </p:txBody>
       </p:sp>
+      <p:pic>
+        <p:nvPicPr>
+          <p:cNvPr id="3074" name="Picture 2" descr="Afbeeldingsresultaat voor realtime hanze">
+            <a:extLst>
+              <a:ext uri="{FF2B5EF4-FFF2-40B4-BE49-F238E27FC236}">
+                <a16:creationId xmlns:a16="http://schemas.microsoft.com/office/drawing/2014/main" id="{2131D3EB-CB1E-4C77-AF2C-A15E8C220788}"/>
+              </a:ext>
+            </a:extLst>
+          </p:cNvPr>
+          <p:cNvPicPr>
+            <a:picLocks noGrp="1" noChangeAspect="1" noChangeArrowheads="1"/>
+          </p:cNvPicPr>
+          <p:nvPr>
+            <p:ph type="pic" sz="quarter" idx="10"/>
+          </p:nvPr>
+        </p:nvPicPr>
+        <p:blipFill>
+          <a:blip r:embed="rId2">
+            <a:extLst>
+              <a:ext uri="{28A0092B-C50C-407E-A947-70E740481C1C}">
+                <a14:useLocalDpi xmlns:a14="http://schemas.microsoft.com/office/drawing/2010/main" val="0"/>
+              </a:ext>
+            </a:extLst>
+          </a:blip>
+          <a:srcRect t="22492" b="22492"/>
+          <a:stretch>
+            <a:fillRect/>
+          </a:stretch>
+        </p:blipFill>
+        <p:spPr bwMode="auto">
+          <a:prstGeom prst="rect">
+            <a:avLst/>
+          </a:prstGeom>
+          <a:noFill/>
+          <a:extLst>
+            <a:ext uri="{909E8E84-426E-40DD-AFC4-6F175D3DCCD1}">
+              <a14:hiddenFill xmlns:a14="http://schemas.microsoft.com/office/drawing/2010/main">
+                <a:solidFill>
+                  <a:srgbClr val="FFFFFF"/>
+                </a:solidFill>
+              </a14:hiddenFill>
+            </a:ext>
+          </a:extLst>
+        </p:spPr>
+      </p:pic>
     </p:spTree>
     <p:extLst>
       <p:ext uri="{BB962C8B-B14F-4D97-AF65-F5344CB8AC3E}">
@@ -5644,6 +5678,36 @@
 </file>
 
 <file path=ppt/slides/slide10.xml><?xml version="1.0" encoding="utf-8"?>
+<p:sld xmlns:a="http://schemas.openxmlformats.org/drawingml/2006/main" xmlns:r="http://schemas.openxmlformats.org/officeDocument/2006/relationships" xmlns:p="http://schemas.openxmlformats.org/presentationml/2006/main">
+  <p:cSld>
+    <p:spTree>
+      <p:nvGrpSpPr>
+        <p:cNvPr id="1" name=""/>
+        <p:cNvGrpSpPr/>
+        <p:nvPr/>
+      </p:nvGrpSpPr>
+      <p:grpSpPr>
+        <a:xfrm>
+          <a:off x="0" y="0"/>
+          <a:ext cx="0" cy="0"/>
+          <a:chOff x="0" y="0"/>
+          <a:chExt cx="0" cy="0"/>
+        </a:xfrm>
+      </p:grpSpPr>
+    </p:spTree>
+    <p:extLst>
+      <p:ext uri="{BB962C8B-B14F-4D97-AF65-F5344CB8AC3E}">
+        <p14:creationId xmlns:p14="http://schemas.microsoft.com/office/powerpoint/2010/main" val="219317095"/>
+      </p:ext>
+    </p:extLst>
+  </p:cSld>
+  <p:clrMapOvr>
+    <a:masterClrMapping/>
+  </p:clrMapOvr>
+</p:sld>
+</file>
+
+<file path=ppt/slides/slide11.xml><?xml version="1.0" encoding="utf-8"?>
 <p:sld xmlns:a="http://schemas.openxmlformats.org/drawingml/2006/main" xmlns:r="http://schemas.openxmlformats.org/officeDocument/2006/relationships" xmlns:p="http://schemas.openxmlformats.org/presentationml/2006/main">
   <p:cSld>
     <p:spTree>
@@ -5782,36 +5846,60 @@
           <a:bodyPr/>
           <a:lstStyle/>
           <a:p>
+            <a:pPr marL="457200" indent="-457200">
+              <a:buFont typeface="Arial" panose="020B0604020202020204" pitchFamily="34" charset="0"/>
+              <a:buChar char="•"/>
+            </a:pPr>
             <a:r>
               <a:rPr lang="nl-NL" dirty="0"/>
               <a:t>Doel</a:t>
             </a:r>
           </a:p>
           <a:p>
+            <a:pPr marL="457200" indent="-457200">
+              <a:buFont typeface="Arial" panose="020B0604020202020204" pitchFamily="34" charset="0"/>
+              <a:buChar char="•"/>
+            </a:pPr>
             <a:r>
               <a:rPr lang="nl-NL" dirty="0"/>
               <a:t>Wat is een microcontroller?</a:t>
             </a:r>
           </a:p>
           <a:p>
+            <a:pPr marL="457200" indent="-457200">
+              <a:buFont typeface="Arial" panose="020B0604020202020204" pitchFamily="34" charset="0"/>
+              <a:buChar char="•"/>
+            </a:pPr>
             <a:r>
               <a:rPr lang="nl-NL" dirty="0"/>
               <a:t>Hardware</a:t>
             </a:r>
           </a:p>
           <a:p>
+            <a:pPr marL="457200" indent="-457200">
+              <a:buFont typeface="Arial" panose="020B0604020202020204" pitchFamily="34" charset="0"/>
+              <a:buChar char="•"/>
+            </a:pPr>
             <a:r>
               <a:rPr lang="nl-NL" dirty="0"/>
               <a:t>Software</a:t>
             </a:r>
           </a:p>
           <a:p>
+            <a:pPr marL="457200" indent="-457200">
+              <a:buFont typeface="Arial" panose="020B0604020202020204" pitchFamily="34" charset="0"/>
+              <a:buChar char="•"/>
+            </a:pPr>
             <a:r>
               <a:rPr lang="nl-NL" dirty="0"/>
               <a:t>Aan de slag!</a:t>
             </a:r>
           </a:p>
           <a:p>
+            <a:pPr marL="457200" indent="-457200">
+              <a:buFont typeface="Arial" panose="020B0604020202020204" pitchFamily="34" charset="0"/>
+              <a:buChar char="•"/>
+            </a:pPr>
             <a:r>
               <a:rPr lang="nl-NL" dirty="0"/>
               <a:t>Wrap-up</a:t>
@@ -5987,49 +6075,12 @@
               <a:buChar char="•"/>
             </a:pPr>
             <a:r>
-              <a:rPr lang="nl-NL" dirty="0"/>
-              <a:t>Raspberry Pi vs Arduino vs ESP8266</a:t>
-            </a:r>
-          </a:p>
-          <a:p>
-            <a:pPr marL="457200" indent="-457200">
-              <a:buFont typeface="Arial" panose="020B0604020202020204" pitchFamily="34" charset="0"/>
-              <a:buChar char="•"/>
-            </a:pPr>
-            <a:r>
-              <a:rPr lang="nl-NL" dirty="0"/>
-              <a:t>Pi: linux pc</a:t>
-            </a:r>
-          </a:p>
-          <a:p>
-            <a:pPr marL="457200" indent="-457200">
-              <a:buFont typeface="Arial" panose="020B0604020202020204" pitchFamily="34" charset="0"/>
-              <a:buChar char="•"/>
-            </a:pPr>
-            <a:r>
-              <a:rPr lang="nl-NL" dirty="0"/>
-              <a:t>Arduino: headless controller</a:t>
-            </a:r>
-          </a:p>
-          <a:p>
-            <a:pPr marL="457200" indent="-457200">
-              <a:buFont typeface="Arial" panose="020B0604020202020204" pitchFamily="34" charset="0"/>
-              <a:buChar char="•"/>
-            </a:pPr>
-            <a:r>
-              <a:rPr lang="nl-NL" strike="sngStrike" dirty="0"/>
-              <a:t>ESP8266: wifi adapter voor Arduino</a:t>
-            </a:r>
-          </a:p>
-          <a:p>
-            <a:pPr marL="457200" indent="-457200">
-              <a:buFont typeface="Arial" panose="020B0604020202020204" pitchFamily="34" charset="0"/>
-              <a:buChar char="•"/>
-            </a:pPr>
-            <a:r>
-              <a:rPr lang="nl-NL" dirty="0"/>
-              <a:t>ESP8266: Arduino compatible met wifi</a:t>
-            </a:r>
+              <a:rPr lang="nl-NL" dirty="0">
+                <a:hlinkClick r:id="rId2"/>
+              </a:rPr>
+              <a:t>https://www.youtube.com/watch?v=-h61tkB5paA</a:t>
+            </a:r>
+            <a:endParaRPr lang="nl-NL" dirty="0"/>
           </a:p>
           <a:p>
             <a:pPr marL="457200" indent="-457200">
@@ -6037,23 +6088,6 @@
               <a:buChar char="•"/>
             </a:pPr>
             <a:endParaRPr lang="nl-NL" dirty="0"/>
-          </a:p>
-          <a:p>
-            <a:pPr marL="457200" indent="-457200">
-              <a:buFont typeface="Arial" panose="020B0604020202020204" pitchFamily="34" charset="0"/>
-              <a:buChar char="•"/>
-            </a:pPr>
-            <a:endParaRPr lang="nl-NL" dirty="0"/>
-          </a:p>
-          <a:p>
-            <a:pPr marL="457200" indent="-457200">
-              <a:buFont typeface="Arial" panose="020B0604020202020204" pitchFamily="34" charset="0"/>
-              <a:buChar char="•"/>
-            </a:pPr>
-            <a:r>
-              <a:rPr lang="nl-NL" dirty="0"/>
-              <a:t>Nadelen ESP8266: 3,3V, geen USB, moeilijk flashen</a:t>
-            </a:r>
           </a:p>
         </p:txBody>
       </p:sp>
@@ -6074,6 +6108,200 @@
           <a:p>
             <a:r>
               <a:rPr lang="nl-NL" dirty="0"/>
+              <a:t>Don’t tease me bro!</a:t>
+            </a:r>
+          </a:p>
+        </p:txBody>
+      </p:sp>
+      <p:pic>
+        <p:nvPicPr>
+          <p:cNvPr id="1028" name="Picture 4" descr="https://hackster.imgix.net/uploads/image/file/93560/MedAlert.png?auto=compress%2Cformat&amp;w=740&amp;h=555&amp;fit=max">
+            <a:extLst>
+              <a:ext uri="{FF2B5EF4-FFF2-40B4-BE49-F238E27FC236}">
+                <a16:creationId xmlns:a16="http://schemas.microsoft.com/office/drawing/2014/main" id="{DD3A9166-B178-4613-8B0D-641A9915FAD6}"/>
+              </a:ext>
+            </a:extLst>
+          </p:cNvPr>
+          <p:cNvPicPr>
+            <a:picLocks noChangeAspect="1" noChangeArrowheads="1"/>
+          </p:cNvPicPr>
+          <p:nvPr/>
+        </p:nvPicPr>
+        <p:blipFill>
+          <a:blip r:embed="rId3">
+            <a:extLst>
+              <a:ext uri="{28A0092B-C50C-407E-A947-70E740481C1C}">
+                <a14:useLocalDpi xmlns:a14="http://schemas.microsoft.com/office/drawing/2010/main" val="0"/>
+              </a:ext>
+            </a:extLst>
+          </a:blip>
+          <a:srcRect/>
+          <a:stretch>
+            <a:fillRect/>
+          </a:stretch>
+        </p:blipFill>
+        <p:spPr bwMode="auto">
+          <a:xfrm>
+            <a:off x="4070508" y="1777041"/>
+            <a:ext cx="4233854" cy="3936161"/>
+          </a:xfrm>
+          <a:prstGeom prst="rect">
+            <a:avLst/>
+          </a:prstGeom>
+          <a:noFill/>
+          <a:extLst>
+            <a:ext uri="{909E8E84-426E-40DD-AFC4-6F175D3DCCD1}">
+              <a14:hiddenFill xmlns:a14="http://schemas.microsoft.com/office/drawing/2010/main">
+                <a:solidFill>
+                  <a:srgbClr val="FFFFFF"/>
+                </a:solidFill>
+              </a14:hiddenFill>
+            </a:ext>
+          </a:extLst>
+        </p:spPr>
+      </p:pic>
+    </p:spTree>
+    <p:extLst>
+      <p:ext uri="{BB962C8B-B14F-4D97-AF65-F5344CB8AC3E}">
+        <p14:creationId xmlns:p14="http://schemas.microsoft.com/office/powerpoint/2010/main" val="4020274954"/>
+      </p:ext>
+    </p:extLst>
+  </p:cSld>
+  <p:clrMapOvr>
+    <a:masterClrMapping/>
+  </p:clrMapOvr>
+</p:sld>
+</file>
+
+<file path=ppt/slides/slide5.xml><?xml version="1.0" encoding="utf-8"?>
+<p:sld xmlns:a="http://schemas.openxmlformats.org/drawingml/2006/main" xmlns:r="http://schemas.openxmlformats.org/officeDocument/2006/relationships" xmlns:p="http://schemas.openxmlformats.org/presentationml/2006/main">
+  <p:cSld>
+    <p:spTree>
+      <p:nvGrpSpPr>
+        <p:cNvPr id="1" name=""/>
+        <p:cNvGrpSpPr/>
+        <p:nvPr/>
+      </p:nvGrpSpPr>
+      <p:grpSpPr>
+        <a:xfrm>
+          <a:off x="0" y="0"/>
+          <a:ext cx="0" cy="0"/>
+          <a:chOff x="0" y="0"/>
+          <a:chExt cx="0" cy="0"/>
+        </a:xfrm>
+      </p:grpSpPr>
+      <p:sp>
+        <p:nvSpPr>
+          <p:cNvPr id="2" name="Tijdelijke aanduiding voor tekst 1"/>
+          <p:cNvSpPr>
+            <a:spLocks noGrp="1"/>
+          </p:cNvSpPr>
+          <p:nvPr>
+            <p:ph type="body" sz="quarter" idx="11"/>
+          </p:nvPr>
+        </p:nvSpPr>
+        <p:spPr>
+          <a:xfrm>
+            <a:off x="640403" y="1069975"/>
+            <a:ext cx="6493116" cy="4121150"/>
+          </a:xfrm>
+        </p:spPr>
+        <p:txBody>
+          <a:bodyPr/>
+          <a:lstStyle/>
+          <a:p>
+            <a:pPr marL="457200" indent="-457200">
+              <a:buFont typeface="Arial" panose="020B0604020202020204" pitchFamily="34" charset="0"/>
+              <a:buChar char="•"/>
+            </a:pPr>
+            <a:r>
+              <a:rPr lang="nl-NL" dirty="0"/>
+              <a:t>Raspberry Pi vs Arduino vs ESP8266</a:t>
+            </a:r>
+          </a:p>
+          <a:p>
+            <a:pPr marL="457200" indent="-457200">
+              <a:buFont typeface="Arial" panose="020B0604020202020204" pitchFamily="34" charset="0"/>
+              <a:buChar char="•"/>
+            </a:pPr>
+            <a:r>
+              <a:rPr lang="nl-NL" dirty="0"/>
+              <a:t>Pi: linux pc</a:t>
+            </a:r>
+          </a:p>
+          <a:p>
+            <a:pPr marL="457200" indent="-457200">
+              <a:buFont typeface="Arial" panose="020B0604020202020204" pitchFamily="34" charset="0"/>
+              <a:buChar char="•"/>
+            </a:pPr>
+            <a:r>
+              <a:rPr lang="nl-NL" dirty="0"/>
+              <a:t>Arduino: headless controller</a:t>
+            </a:r>
+          </a:p>
+          <a:p>
+            <a:pPr marL="457200" indent="-457200">
+              <a:buFont typeface="Arial" panose="020B0604020202020204" pitchFamily="34" charset="0"/>
+              <a:buChar char="•"/>
+            </a:pPr>
+            <a:r>
+              <a:rPr lang="nl-NL" strike="sngStrike" dirty="0"/>
+              <a:t>ESP8266: wifi adapter voor Arduino</a:t>
+            </a:r>
+          </a:p>
+          <a:p>
+            <a:pPr marL="457200" indent="-457200">
+              <a:buFont typeface="Arial" panose="020B0604020202020204" pitchFamily="34" charset="0"/>
+              <a:buChar char="•"/>
+            </a:pPr>
+            <a:r>
+              <a:rPr lang="nl-NL" dirty="0"/>
+              <a:t>ESP8266: Arduino compatible met wifi</a:t>
+            </a:r>
+          </a:p>
+          <a:p>
+            <a:pPr marL="457200" indent="-457200">
+              <a:buFont typeface="Arial" panose="020B0604020202020204" pitchFamily="34" charset="0"/>
+              <a:buChar char="•"/>
+            </a:pPr>
+            <a:endParaRPr lang="nl-NL" dirty="0"/>
+          </a:p>
+          <a:p>
+            <a:pPr marL="457200" indent="-457200">
+              <a:buFont typeface="Arial" panose="020B0604020202020204" pitchFamily="34" charset="0"/>
+              <a:buChar char="•"/>
+            </a:pPr>
+            <a:endParaRPr lang="nl-NL" dirty="0"/>
+          </a:p>
+          <a:p>
+            <a:pPr marL="457200" indent="-457200">
+              <a:buFont typeface="Arial" panose="020B0604020202020204" pitchFamily="34" charset="0"/>
+              <a:buChar char="•"/>
+            </a:pPr>
+            <a:r>
+              <a:rPr lang="nl-NL" dirty="0"/>
+              <a:t>Nadelen ESP8266: 3,3V, geen USB, moeilijk flashen</a:t>
+            </a:r>
+          </a:p>
+        </p:txBody>
+      </p:sp>
+      <p:sp>
+        <p:nvSpPr>
+          <p:cNvPr id="3" name="Tijdelijke aanduiding voor tekst 2"/>
+          <p:cNvSpPr>
+            <a:spLocks noGrp="1"/>
+          </p:cNvSpPr>
+          <p:nvPr>
+            <p:ph type="body" sz="quarter" idx="12"/>
+          </p:nvPr>
+        </p:nvSpPr>
+        <p:spPr/>
+        <p:txBody>
+          <a:bodyPr/>
+          <a:lstStyle/>
+          <a:p>
+            <a:r>
+              <a:rPr lang="nl-NL" dirty="0"/>
               <a:t>Wat is een microcontroller?</a:t>
             </a:r>
           </a:p>
@@ -6095,7 +6323,7 @@
 </p:sld>
 </file>
 
-<file path=ppt/slides/slide5.xml><?xml version="1.0" encoding="utf-8"?>
+<file path=ppt/slides/slide6.xml><?xml version="1.0" encoding="utf-8"?>
 <p:sld xmlns:a="http://schemas.openxmlformats.org/drawingml/2006/main" xmlns:r="http://schemas.openxmlformats.org/officeDocument/2006/relationships" xmlns:p="http://schemas.openxmlformats.org/presentationml/2006/main">
   <p:cSld>
     <p:spTree>
@@ -6297,136 +6525,386 @@
           </a:extLst>
         </p:spPr>
       </p:pic>
+      <p:pic>
+        <p:nvPicPr>
+          <p:cNvPr id="2050" name="Picture 2" descr="Afbeeldingsresultaat voor neopixel">
+            <a:extLst>
+              <a:ext uri="{FF2B5EF4-FFF2-40B4-BE49-F238E27FC236}">
+                <a16:creationId xmlns:a16="http://schemas.microsoft.com/office/drawing/2014/main" id="{AD527CAE-418B-4EE2-833A-0D64A57B1A20}"/>
+              </a:ext>
+            </a:extLst>
+          </p:cNvPr>
+          <p:cNvPicPr>
+            <a:picLocks noChangeAspect="1" noChangeArrowheads="1"/>
+          </p:cNvPicPr>
+          <p:nvPr/>
+        </p:nvPicPr>
+        <p:blipFill>
+          <a:blip r:embed="rId4">
+            <a:extLst>
+              <a:ext uri="{28A0092B-C50C-407E-A947-70E740481C1C}">
+                <a14:useLocalDpi xmlns:a14="http://schemas.microsoft.com/office/drawing/2010/main" val="0"/>
+              </a:ext>
+            </a:extLst>
+          </a:blip>
+          <a:srcRect/>
+          <a:stretch>
+            <a:fillRect/>
+          </a:stretch>
+        </p:blipFill>
+        <p:spPr bwMode="auto">
+          <a:xfrm>
+            <a:off x="575557" y="3940176"/>
+            <a:ext cx="1153512" cy="864020"/>
+          </a:xfrm>
+          <a:prstGeom prst="rect">
+            <a:avLst/>
+          </a:prstGeom>
+          <a:noFill/>
+          <a:extLst>
+            <a:ext uri="{909E8E84-426E-40DD-AFC4-6F175D3DCCD1}">
+              <a14:hiddenFill xmlns:a14="http://schemas.microsoft.com/office/drawing/2010/main">
+                <a:solidFill>
+                  <a:srgbClr val="FFFFFF"/>
+                </a:solidFill>
+              </a14:hiddenFill>
+            </a:ext>
+          </a:extLst>
+        </p:spPr>
+      </p:pic>
+      <p:pic>
+        <p:nvPicPr>
+          <p:cNvPr id="2054" name="Picture 6" descr="Afbeeldingsresultaat voor neopixel">
+            <a:extLst>
+              <a:ext uri="{FF2B5EF4-FFF2-40B4-BE49-F238E27FC236}">
+                <a16:creationId xmlns:a16="http://schemas.microsoft.com/office/drawing/2014/main" id="{317274CA-C9EC-4A7F-B49D-11C95F413779}"/>
+              </a:ext>
+            </a:extLst>
+          </p:cNvPr>
+          <p:cNvPicPr>
+            <a:picLocks noChangeAspect="1" noChangeArrowheads="1"/>
+          </p:cNvPicPr>
+          <p:nvPr/>
+        </p:nvPicPr>
+        <p:blipFill>
+          <a:blip r:embed="rId5">
+            <a:extLst>
+              <a:ext uri="{28A0092B-C50C-407E-A947-70E740481C1C}">
+                <a14:useLocalDpi xmlns:a14="http://schemas.microsoft.com/office/drawing/2010/main" val="0"/>
+              </a:ext>
+            </a:extLst>
+          </a:blip>
+          <a:srcRect/>
+          <a:stretch>
+            <a:fillRect/>
+          </a:stretch>
+        </p:blipFill>
+        <p:spPr bwMode="auto">
+          <a:xfrm>
+            <a:off x="1800516" y="3940175"/>
+            <a:ext cx="923745" cy="864020"/>
+          </a:xfrm>
+          <a:prstGeom prst="rect">
+            <a:avLst/>
+          </a:prstGeom>
+          <a:noFill/>
+          <a:extLst>
+            <a:ext uri="{909E8E84-426E-40DD-AFC4-6F175D3DCCD1}">
+              <a14:hiddenFill xmlns:a14="http://schemas.microsoft.com/office/drawing/2010/main">
+                <a:solidFill>
+                  <a:srgbClr val="FFFFFF"/>
+                </a:solidFill>
+              </a14:hiddenFill>
+            </a:ext>
+          </a:extLst>
+        </p:spPr>
+      </p:pic>
+      <p:pic>
+        <p:nvPicPr>
+          <p:cNvPr id="2056" name="Picture 8" descr="Afbeeldingsresultaat voor neopixel">
+            <a:extLst>
+              <a:ext uri="{FF2B5EF4-FFF2-40B4-BE49-F238E27FC236}">
+                <a16:creationId xmlns:a16="http://schemas.microsoft.com/office/drawing/2014/main" id="{302C2550-0473-4726-8D0A-603A6FE7A38C}"/>
+              </a:ext>
+            </a:extLst>
+          </p:cNvPr>
+          <p:cNvPicPr>
+            <a:picLocks noChangeAspect="1" noChangeArrowheads="1"/>
+          </p:cNvPicPr>
+          <p:nvPr/>
+        </p:nvPicPr>
+        <p:blipFill>
+          <a:blip r:embed="rId6">
+            <a:extLst>
+              <a:ext uri="{28A0092B-C50C-407E-A947-70E740481C1C}">
+                <a14:useLocalDpi xmlns:a14="http://schemas.microsoft.com/office/drawing/2010/main" val="0"/>
+              </a:ext>
+            </a:extLst>
+          </a:blip>
+          <a:srcRect/>
+          <a:stretch>
+            <a:fillRect/>
+          </a:stretch>
+        </p:blipFill>
+        <p:spPr bwMode="auto">
+          <a:xfrm>
+            <a:off x="2773985" y="3940176"/>
+            <a:ext cx="864020" cy="864020"/>
+          </a:xfrm>
+          <a:prstGeom prst="rect">
+            <a:avLst/>
+          </a:prstGeom>
+          <a:noFill/>
+          <a:extLst>
+            <a:ext uri="{909E8E84-426E-40DD-AFC4-6F175D3DCCD1}">
+              <a14:hiddenFill xmlns:a14="http://schemas.microsoft.com/office/drawing/2010/main">
+                <a:solidFill>
+                  <a:srgbClr val="FFFFFF"/>
+                </a:solidFill>
+              </a14:hiddenFill>
+            </a:ext>
+          </a:extLst>
+        </p:spPr>
+      </p:pic>
+      <p:pic>
+        <p:nvPicPr>
+          <p:cNvPr id="2058" name="Picture 10" descr="Afbeeldingsresultaat voor neopixel">
+            <a:extLst>
+              <a:ext uri="{FF2B5EF4-FFF2-40B4-BE49-F238E27FC236}">
+                <a16:creationId xmlns:a16="http://schemas.microsoft.com/office/drawing/2014/main" id="{51C61E6E-EF4A-4ADC-A1DB-6A68E08139D1}"/>
+              </a:ext>
+            </a:extLst>
+          </p:cNvPr>
+          <p:cNvPicPr>
+            <a:picLocks noChangeAspect="1" noChangeArrowheads="1"/>
+          </p:cNvPicPr>
+          <p:nvPr/>
+        </p:nvPicPr>
+        <p:blipFill>
+          <a:blip r:embed="rId7">
+            <a:extLst>
+              <a:ext uri="{28A0092B-C50C-407E-A947-70E740481C1C}">
+                <a14:useLocalDpi xmlns:a14="http://schemas.microsoft.com/office/drawing/2010/main" val="0"/>
+              </a:ext>
+            </a:extLst>
+          </a:blip>
+          <a:srcRect/>
+          <a:stretch>
+            <a:fillRect/>
+          </a:stretch>
+        </p:blipFill>
+        <p:spPr bwMode="auto">
+          <a:xfrm>
+            <a:off x="7084628" y="2028211"/>
+            <a:ext cx="1645304" cy="1645304"/>
+          </a:xfrm>
+          <a:prstGeom prst="rect">
+            <a:avLst/>
+          </a:prstGeom>
+          <a:noFill/>
+          <a:extLst>
+            <a:ext uri="{909E8E84-426E-40DD-AFC4-6F175D3DCCD1}">
+              <a14:hiddenFill xmlns:a14="http://schemas.microsoft.com/office/drawing/2010/main">
+                <a:solidFill>
+                  <a:srgbClr val="FFFFFF"/>
+                </a:solidFill>
+              </a14:hiddenFill>
+            </a:ext>
+          </a:extLst>
+        </p:spPr>
+      </p:pic>
+      <p:pic>
+        <p:nvPicPr>
+          <p:cNvPr id="2060" name="Picture 12" descr="Afbeeldingsresultaat voor neopixel">
+            <a:extLst>
+              <a:ext uri="{FF2B5EF4-FFF2-40B4-BE49-F238E27FC236}">
+                <a16:creationId xmlns:a16="http://schemas.microsoft.com/office/drawing/2014/main" id="{B6DBBE4D-E916-458E-ABF2-6C8D3CB889DE}"/>
+              </a:ext>
+            </a:extLst>
+          </p:cNvPr>
+          <p:cNvPicPr>
+            <a:picLocks noChangeAspect="1" noChangeArrowheads="1"/>
+          </p:cNvPicPr>
+          <p:nvPr/>
+        </p:nvPicPr>
+        <p:blipFill>
+          <a:blip r:embed="rId8">
+            <a:extLst>
+              <a:ext uri="{28A0092B-C50C-407E-A947-70E740481C1C}">
+                <a14:useLocalDpi xmlns:a14="http://schemas.microsoft.com/office/drawing/2010/main" val="0"/>
+              </a:ext>
+            </a:extLst>
+          </a:blip>
+          <a:srcRect/>
+          <a:stretch>
+            <a:fillRect/>
+          </a:stretch>
+        </p:blipFill>
+        <p:spPr bwMode="auto">
+          <a:xfrm>
+            <a:off x="563504" y="4868917"/>
+            <a:ext cx="1165565" cy="873049"/>
+          </a:xfrm>
+          <a:prstGeom prst="rect">
+            <a:avLst/>
+          </a:prstGeom>
+          <a:noFill/>
+          <a:extLst>
+            <a:ext uri="{909E8E84-426E-40DD-AFC4-6F175D3DCCD1}">
+              <a14:hiddenFill xmlns:a14="http://schemas.microsoft.com/office/drawing/2010/main">
+                <a:solidFill>
+                  <a:srgbClr val="FFFFFF"/>
+                </a:solidFill>
+              </a14:hiddenFill>
+            </a:ext>
+          </a:extLst>
+        </p:spPr>
+      </p:pic>
+      <p:pic>
+        <p:nvPicPr>
+          <p:cNvPr id="2064" name="Picture 16" descr="Afbeeldingsresultaat voor neopixel">
+            <a:extLst>
+              <a:ext uri="{FF2B5EF4-FFF2-40B4-BE49-F238E27FC236}">
+                <a16:creationId xmlns:a16="http://schemas.microsoft.com/office/drawing/2014/main" id="{AB9267F8-D393-4CFE-BD71-98CE2DB94354}"/>
+              </a:ext>
+            </a:extLst>
+          </p:cNvPr>
+          <p:cNvPicPr>
+            <a:picLocks noChangeAspect="1" noChangeArrowheads="1"/>
+          </p:cNvPicPr>
+          <p:nvPr/>
+        </p:nvPicPr>
+        <p:blipFill>
+          <a:blip r:embed="rId9">
+            <a:extLst>
+              <a:ext uri="{28A0092B-C50C-407E-A947-70E740481C1C}">
+                <a14:useLocalDpi xmlns:a14="http://schemas.microsoft.com/office/drawing/2010/main" val="0"/>
+              </a:ext>
+            </a:extLst>
+          </a:blip>
+          <a:srcRect/>
+          <a:stretch>
+            <a:fillRect/>
+          </a:stretch>
+        </p:blipFill>
+        <p:spPr bwMode="auto">
+          <a:xfrm>
+            <a:off x="1816547" y="4868918"/>
+            <a:ext cx="1078950" cy="864020"/>
+          </a:xfrm>
+          <a:prstGeom prst="rect">
+            <a:avLst/>
+          </a:prstGeom>
+          <a:noFill/>
+          <a:extLst>
+            <a:ext uri="{909E8E84-426E-40DD-AFC4-6F175D3DCCD1}">
+              <a14:hiddenFill xmlns:a14="http://schemas.microsoft.com/office/drawing/2010/main">
+                <a:solidFill>
+                  <a:srgbClr val="FFFFFF"/>
+                </a:solidFill>
+              </a14:hiddenFill>
+            </a:ext>
+          </a:extLst>
+        </p:spPr>
+      </p:pic>
+      <p:pic>
+        <p:nvPicPr>
+          <p:cNvPr id="2066" name="Picture 18" descr="Afbeeldingsresultaat voor neopixel">
+            <a:extLst>
+              <a:ext uri="{FF2B5EF4-FFF2-40B4-BE49-F238E27FC236}">
+                <a16:creationId xmlns:a16="http://schemas.microsoft.com/office/drawing/2014/main" id="{72FB1F9C-0C80-40C2-8287-3EE65ED080AA}"/>
+              </a:ext>
+            </a:extLst>
+          </p:cNvPr>
+          <p:cNvPicPr>
+            <a:picLocks noChangeAspect="1" noChangeArrowheads="1"/>
+          </p:cNvPicPr>
+          <p:nvPr/>
+        </p:nvPicPr>
+        <p:blipFill>
+          <a:blip r:embed="rId10">
+            <a:extLst>
+              <a:ext uri="{28A0092B-C50C-407E-A947-70E740481C1C}">
+                <a14:useLocalDpi xmlns:a14="http://schemas.microsoft.com/office/drawing/2010/main" val="0"/>
+              </a:ext>
+            </a:extLst>
+          </a:blip>
+          <a:srcRect/>
+          <a:stretch>
+            <a:fillRect/>
+          </a:stretch>
+        </p:blipFill>
+        <p:spPr bwMode="auto">
+          <a:xfrm>
+            <a:off x="2911551" y="4868917"/>
+            <a:ext cx="1069332" cy="864020"/>
+          </a:xfrm>
+          <a:prstGeom prst="rect">
+            <a:avLst/>
+          </a:prstGeom>
+          <a:noFill/>
+          <a:extLst>
+            <a:ext uri="{909E8E84-426E-40DD-AFC4-6F175D3DCCD1}">
+              <a14:hiddenFill xmlns:a14="http://schemas.microsoft.com/office/drawing/2010/main">
+                <a:solidFill>
+                  <a:srgbClr val="FFFFFF"/>
+                </a:solidFill>
+              </a14:hiddenFill>
+            </a:ext>
+          </a:extLst>
+        </p:spPr>
+      </p:pic>
+      <p:pic>
+        <p:nvPicPr>
+          <p:cNvPr id="2070" name="Picture 22" descr="Afbeeldingsresultaat voor neopixel">
+            <a:extLst>
+              <a:ext uri="{FF2B5EF4-FFF2-40B4-BE49-F238E27FC236}">
+                <a16:creationId xmlns:a16="http://schemas.microsoft.com/office/drawing/2014/main" id="{FBE35D32-1886-4761-82B4-37EF84A9A276}"/>
+              </a:ext>
+            </a:extLst>
+          </p:cNvPr>
+          <p:cNvPicPr>
+            <a:picLocks noChangeAspect="1" noChangeArrowheads="1"/>
+          </p:cNvPicPr>
+          <p:nvPr/>
+        </p:nvPicPr>
+        <p:blipFill>
+          <a:blip r:embed="rId11">
+            <a:extLst>
+              <a:ext uri="{28A0092B-C50C-407E-A947-70E740481C1C}">
+                <a14:useLocalDpi xmlns:a14="http://schemas.microsoft.com/office/drawing/2010/main" val="0"/>
+              </a:ext>
+            </a:extLst>
+          </a:blip>
+          <a:srcRect/>
+          <a:stretch>
+            <a:fillRect/>
+          </a:stretch>
+        </p:blipFill>
+        <p:spPr bwMode="auto">
+          <a:xfrm>
+            <a:off x="3663322" y="3937223"/>
+            <a:ext cx="1069332" cy="856318"/>
+          </a:xfrm>
+          <a:prstGeom prst="rect">
+            <a:avLst/>
+          </a:prstGeom>
+          <a:noFill/>
+          <a:extLst>
+            <a:ext uri="{909E8E84-426E-40DD-AFC4-6F175D3DCCD1}">
+              <a14:hiddenFill xmlns:a14="http://schemas.microsoft.com/office/drawing/2010/main">
+                <a:solidFill>
+                  <a:srgbClr val="FFFFFF"/>
+                </a:solidFill>
+              </a14:hiddenFill>
+            </a:ext>
+          </a:extLst>
+        </p:spPr>
+      </p:pic>
     </p:spTree>
     <p:extLst>
       <p:ext uri="{BB962C8B-B14F-4D97-AF65-F5344CB8AC3E}">
         <p14:creationId xmlns:p14="http://schemas.microsoft.com/office/powerpoint/2010/main" val="1329518726"/>
-      </p:ext>
-    </p:extLst>
-  </p:cSld>
-  <p:clrMapOvr>
-    <a:masterClrMapping/>
-  </p:clrMapOvr>
-</p:sld>
-</file>
-
-<file path=ppt/slides/slide6.xml><?xml version="1.0" encoding="utf-8"?>
-<p:sld xmlns:a="http://schemas.openxmlformats.org/drawingml/2006/main" xmlns:r="http://schemas.openxmlformats.org/officeDocument/2006/relationships" xmlns:p="http://schemas.openxmlformats.org/presentationml/2006/main">
-  <p:cSld>
-    <p:spTree>
-      <p:nvGrpSpPr>
-        <p:cNvPr id="1" name=""/>
-        <p:cNvGrpSpPr/>
-        <p:nvPr/>
-      </p:nvGrpSpPr>
-      <p:grpSpPr>
-        <a:xfrm>
-          <a:off x="0" y="0"/>
-          <a:ext cx="0" cy="0"/>
-          <a:chOff x="0" y="0"/>
-          <a:chExt cx="0" cy="0"/>
-        </a:xfrm>
-      </p:grpSpPr>
-      <p:sp>
-        <p:nvSpPr>
-          <p:cNvPr id="2" name="Tijdelijke aanduiding voor tekst 1"/>
-          <p:cNvSpPr>
-            <a:spLocks noGrp="1"/>
-          </p:cNvSpPr>
-          <p:nvPr>
-            <p:ph type="body" sz="quarter" idx="11"/>
-          </p:nvPr>
-        </p:nvSpPr>
-        <p:spPr>
-          <a:xfrm>
-            <a:off x="640403" y="1069975"/>
-            <a:ext cx="6493116" cy="4121150"/>
-          </a:xfrm>
-        </p:spPr>
-        <p:txBody>
-          <a:bodyPr/>
-          <a:lstStyle/>
-          <a:p>
-            <a:pPr marL="457200" indent="-457200">
-              <a:buFont typeface="Arial" panose="020B0604020202020204" pitchFamily="34" charset="0"/>
-              <a:buChar char="•"/>
-            </a:pPr>
-            <a:r>
-              <a:rPr lang="nl-NL" dirty="0"/>
-              <a:t>PlatformIO (Visual Studio Code plugin)</a:t>
-            </a:r>
-          </a:p>
-          <a:p>
-            <a:pPr marL="457200" indent="-457200">
-              <a:buFont typeface="Arial" panose="020B0604020202020204" pitchFamily="34" charset="0"/>
-              <a:buChar char="•"/>
-            </a:pPr>
-            <a:r>
-              <a:rPr lang="nl-NL" dirty="0"/>
-              <a:t>Arduino framework</a:t>
-            </a:r>
-          </a:p>
-          <a:p>
-            <a:pPr marL="457200" indent="-457200">
-              <a:buFont typeface="Arial" panose="020B0604020202020204" pitchFamily="34" charset="0"/>
-              <a:buChar char="•"/>
-            </a:pPr>
-            <a:r>
-              <a:rPr lang="nl-NL" dirty="0"/>
-              <a:t>NeoPixelBus library voor LEDs</a:t>
-            </a:r>
-          </a:p>
-          <a:p>
-            <a:pPr marL="457200" indent="-457200">
-              <a:buFont typeface="Arial" panose="020B0604020202020204" pitchFamily="34" charset="0"/>
-              <a:buChar char="•"/>
-            </a:pPr>
-            <a:r>
-              <a:rPr lang="nl-NL" dirty="0"/>
-              <a:t>WifiManager library voor instellen wifi</a:t>
-            </a:r>
-          </a:p>
-          <a:p>
-            <a:pPr marL="457200" indent="-457200">
-              <a:buFont typeface="Arial" panose="020B0604020202020204" pitchFamily="34" charset="0"/>
-              <a:buChar char="•"/>
-            </a:pPr>
-            <a:r>
-              <a:rPr lang="nl-NL" dirty="0"/>
-              <a:t>NTPClient voor internettijd</a:t>
-            </a:r>
-          </a:p>
-        </p:txBody>
-      </p:sp>
-      <p:sp>
-        <p:nvSpPr>
-          <p:cNvPr id="3" name="Tijdelijke aanduiding voor tekst 2"/>
-          <p:cNvSpPr>
-            <a:spLocks noGrp="1"/>
-          </p:cNvSpPr>
-          <p:nvPr>
-            <p:ph type="body" sz="quarter" idx="12"/>
-          </p:nvPr>
-        </p:nvSpPr>
-        <p:spPr/>
-        <p:txBody>
-          <a:bodyPr/>
-          <a:lstStyle/>
-          <a:p>
-            <a:r>
-              <a:rPr lang="nl-NL" dirty="0"/>
-              <a:t>Software</a:t>
-            </a:r>
-          </a:p>
-          <a:p>
-            <a:endParaRPr lang="nl-NL" dirty="0"/>
-          </a:p>
-        </p:txBody>
-      </p:sp>
-    </p:spTree>
-    <p:extLst>
-      <p:ext uri="{BB962C8B-B14F-4D97-AF65-F5344CB8AC3E}">
-        <p14:creationId xmlns:p14="http://schemas.microsoft.com/office/powerpoint/2010/main" val="930255903"/>
       </p:ext>
     </p:extLst>
   </p:cSld>
@@ -6466,7 +6944,7 @@
         <p:spPr>
           <a:xfrm>
             <a:off x="640403" y="1069975"/>
-            <a:ext cx="7735846" cy="4121150"/>
+            <a:ext cx="6493116" cy="4121150"/>
           </a:xfrm>
         </p:spPr>
         <p:txBody>
@@ -6479,7 +6957,147 @@
             </a:pPr>
             <a:r>
               <a:rPr lang="nl-NL" dirty="0"/>
-              <a:t>https://github.com/nielsmaneschijn/lotlr</a:t>
+              <a:t>Arduino framework</a:t>
+            </a:r>
+          </a:p>
+          <a:p>
+            <a:pPr marL="1200150" lvl="1" indent="-457200">
+              <a:buFont typeface="Arial" panose="020B0604020202020204" pitchFamily="34" charset="0"/>
+              <a:buChar char="•"/>
+            </a:pPr>
+            <a:r>
+              <a:rPr lang="nl-NL" dirty="0"/>
+              <a:t>C++ zonder de scherpste randjes</a:t>
+            </a:r>
+          </a:p>
+          <a:p>
+            <a:pPr marL="1200150" lvl="1" indent="-457200">
+              <a:buFont typeface="Arial" panose="020B0604020202020204" pitchFamily="34" charset="0"/>
+              <a:buChar char="•"/>
+            </a:pPr>
+            <a:r>
+              <a:rPr lang="nl-NL" dirty="0"/>
+              <a:t>Volgorde van functies maakt niet uit, geen makefiles etc</a:t>
+            </a:r>
+          </a:p>
+          <a:p>
+            <a:pPr marL="1200150" lvl="1" indent="-457200">
+              <a:buFont typeface="Arial" panose="020B0604020202020204" pitchFamily="34" charset="0"/>
+              <a:buChar char="•"/>
+            </a:pPr>
+            <a:r>
+              <a:rPr lang="nl-NL" dirty="0"/>
+              <a:t>Hardware abstractie (zelfde code op verschillende chips)</a:t>
+            </a:r>
+          </a:p>
+          <a:p>
+            <a:pPr marL="1200150" lvl="1" indent="-457200">
+              <a:buFont typeface="Arial" panose="020B0604020202020204" pitchFamily="34" charset="0"/>
+              <a:buChar char="•"/>
+            </a:pPr>
+            <a:r>
+              <a:rPr lang="nl-NL" dirty="0"/>
+              <a:t>Talloze libraries voor diverse sensoren e.d.</a:t>
+            </a:r>
+          </a:p>
+          <a:p>
+            <a:pPr marL="457200" indent="-457200">
+              <a:buFont typeface="Arial" panose="020B0604020202020204" pitchFamily="34" charset="0"/>
+              <a:buChar char="•"/>
+            </a:pPr>
+            <a:r>
+              <a:rPr lang="nl-NL" dirty="0"/>
+              <a:t>PlatformIO (Visual Studio Code plugin)</a:t>
+            </a:r>
+          </a:p>
+          <a:p>
+            <a:pPr marL="1200150" lvl="1" indent="-457200">
+              <a:buFont typeface="Arial" panose="020B0604020202020204" pitchFamily="34" charset="0"/>
+              <a:buChar char="•"/>
+            </a:pPr>
+            <a:r>
+              <a:rPr lang="nl-NL" dirty="0"/>
+              <a:t>Volwaardiger IDE dan Arduino IDE</a:t>
+            </a:r>
+          </a:p>
+          <a:p>
+            <a:pPr marL="1200150" lvl="1" indent="-457200">
+              <a:buFont typeface="Arial" panose="020B0604020202020204" pitchFamily="34" charset="0"/>
+              <a:buChar char="•"/>
+            </a:pPr>
+            <a:r>
+              <a:rPr lang="nl-NL" dirty="0"/>
+              <a:t>Beter library management</a:t>
+            </a:r>
+          </a:p>
+          <a:p>
+            <a:pPr marL="1200150" lvl="1" indent="-457200">
+              <a:buFont typeface="Arial" panose="020B0604020202020204" pitchFamily="34" charset="0"/>
+              <a:buChar char="•"/>
+            </a:pPr>
+            <a:r>
+              <a:rPr lang="nl-NL" dirty="0"/>
+              <a:t>Makkelijk extra libs ophalen</a:t>
+            </a:r>
+          </a:p>
+          <a:p>
+            <a:pPr marL="1200150" lvl="1" indent="-457200">
+              <a:buFont typeface="Arial" panose="020B0604020202020204" pitchFamily="34" charset="0"/>
+              <a:buChar char="•"/>
+            </a:pPr>
+            <a:r>
+              <a:rPr lang="nl-NL" dirty="0"/>
+              <a:t>Syntax highlighting, syntax checking en ctrl-doorklikken</a:t>
+            </a:r>
+          </a:p>
+          <a:p>
+            <a:pPr marL="1200150" lvl="1" indent="-457200">
+              <a:buFont typeface="Arial" panose="020B0604020202020204" pitchFamily="34" charset="0"/>
+              <a:buChar char="•"/>
+            </a:pPr>
+            <a:r>
+              <a:rPr lang="nl-NL" dirty="0"/>
+              <a:t>Debug terminal</a:t>
+            </a:r>
+          </a:p>
+          <a:p>
+            <a:pPr marL="1200150" lvl="1" indent="-457200">
+              <a:buFont typeface="Arial" panose="020B0604020202020204" pitchFamily="34" charset="0"/>
+              <a:buChar char="•"/>
+            </a:pPr>
+            <a:r>
+              <a:rPr lang="nl-NL" dirty="0"/>
+              <a:t>Builden voor meerdere platformen tegelijk</a:t>
+            </a:r>
+          </a:p>
+          <a:p>
+            <a:pPr marL="457200" indent="-457200">
+              <a:buFont typeface="Arial" panose="020B0604020202020204" pitchFamily="34" charset="0"/>
+              <a:buChar char="•"/>
+            </a:pPr>
+            <a:r>
+              <a:rPr lang="nl-NL" dirty="0"/>
+              <a:t>NeoPixelBus library voor LEDs</a:t>
+            </a:r>
+          </a:p>
+          <a:p>
+            <a:pPr marL="457200" indent="-457200">
+              <a:buFont typeface="Arial" panose="020B0604020202020204" pitchFamily="34" charset="0"/>
+              <a:buChar char="•"/>
+            </a:pPr>
+            <a:r>
+              <a:rPr lang="nl-NL" dirty="0"/>
+              <a:t>WifiManager library voor instellen wifi</a:t>
+            </a:r>
+          </a:p>
+          <a:p>
+            <a:pPr marL="457200" indent="-457200">
+              <a:buFont typeface="Arial" panose="020B0604020202020204" pitchFamily="34" charset="0"/>
+              <a:buChar char="•"/>
+            </a:pPr>
+            <a:r>
+              <a:rPr lang="nl-NL" dirty="0"/>
+              <a:t>NTPClient voor internettijd</a:t>
             </a:r>
           </a:p>
         </p:txBody>
@@ -6501,7 +7119,7 @@
           <a:p>
             <a:r>
               <a:rPr lang="nl-NL" dirty="0"/>
-              <a:t>Aan de slag!</a:t>
+              <a:t>Software</a:t>
             </a:r>
           </a:p>
           <a:p>
@@ -6512,7 +7130,7 @@
     </p:spTree>
     <p:extLst>
       <p:ext uri="{BB962C8B-B14F-4D97-AF65-F5344CB8AC3E}">
-        <p14:creationId xmlns:p14="http://schemas.microsoft.com/office/powerpoint/2010/main" val="2214894094"/>
+        <p14:creationId xmlns:p14="http://schemas.microsoft.com/office/powerpoint/2010/main" val="930255903"/>
       </p:ext>
     </p:extLst>
   </p:cSld>
@@ -6565,97 +7183,7 @@
             </a:pPr>
             <a:r>
               <a:rPr lang="nl-NL" dirty="0"/>
-              <a:t>Home automation:</a:t>
-            </a:r>
-          </a:p>
-          <a:p>
-            <a:pPr marL="457200" indent="-457200">
-              <a:buFont typeface="Arial" panose="020B0604020202020204" pitchFamily="34" charset="0"/>
-              <a:buChar char="•"/>
-            </a:pPr>
-            <a:r>
-              <a:rPr lang="nl-NL" dirty="0"/>
-              <a:t>MQTT</a:t>
-            </a:r>
-          </a:p>
-          <a:p>
-            <a:pPr marL="457200" indent="-457200">
-              <a:buFont typeface="Arial" panose="020B0604020202020204" pitchFamily="34" charset="0"/>
-              <a:buChar char="•"/>
-            </a:pPr>
-            <a:r>
-              <a:rPr lang="nl-NL" dirty="0"/>
-              <a:t>Home Assistant</a:t>
-            </a:r>
-          </a:p>
-          <a:p>
-            <a:pPr marL="457200" indent="-457200">
-              <a:buFont typeface="Arial" panose="020B0604020202020204" pitchFamily="34" charset="0"/>
-              <a:buChar char="•"/>
-            </a:pPr>
-            <a:r>
-              <a:rPr lang="nl-NL" dirty="0"/>
-              <a:t>Node Red</a:t>
-            </a:r>
-          </a:p>
-          <a:p>
-            <a:pPr marL="457200" indent="-457200">
-              <a:buFont typeface="Arial" panose="020B0604020202020204" pitchFamily="34" charset="0"/>
-              <a:buChar char="•"/>
-            </a:pPr>
-            <a:r>
-              <a:rPr lang="nl-NL" dirty="0"/>
-              <a:t>Sonoff</a:t>
-            </a:r>
-          </a:p>
-          <a:p>
-            <a:pPr marL="457200" indent="-457200">
-              <a:buFont typeface="Arial" panose="020B0604020202020204" pitchFamily="34" charset="0"/>
-              <a:buChar char="•"/>
-            </a:pPr>
-            <a:r>
-              <a:rPr lang="nl-NL" dirty="0"/>
-              <a:t>Standaard firmwares:</a:t>
-            </a:r>
-          </a:p>
-          <a:p>
-            <a:pPr marL="457200" indent="-457200">
-              <a:buFont typeface="Arial" panose="020B0604020202020204" pitchFamily="34" charset="0"/>
-              <a:buChar char="•"/>
-            </a:pPr>
-            <a:r>
-              <a:rPr lang="nl-NL" dirty="0"/>
-              <a:t>Tasmota/ESPEasy</a:t>
-            </a:r>
-          </a:p>
-          <a:p>
-            <a:pPr marL="457200" indent="-457200">
-              <a:buFont typeface="Arial" panose="020B0604020202020204" pitchFamily="34" charset="0"/>
-              <a:buChar char="•"/>
-            </a:pPr>
-            <a:r>
-              <a:rPr lang="nl-NL" dirty="0"/>
-              <a:t>Shoppen:</a:t>
-            </a:r>
-          </a:p>
-          <a:p>
-            <a:pPr marL="457200" indent="-457200">
-              <a:buFont typeface="Arial" panose="020B0604020202020204" pitchFamily="34" charset="0"/>
-              <a:buChar char="•"/>
-            </a:pPr>
-            <a:r>
-              <a:rPr lang="nl-NL" dirty="0"/>
-              <a:t>banggood.com</a:t>
-            </a:r>
-          </a:p>
-          <a:p>
-            <a:pPr marL="457200" indent="-457200">
-              <a:buFont typeface="Arial" panose="020B0604020202020204" pitchFamily="34" charset="0"/>
-              <a:buChar char="•"/>
-            </a:pPr>
-            <a:r>
-              <a:rPr lang="nl-NL" dirty="0"/>
-              <a:t>aliexpress.com</a:t>
+              <a:t>https://github.com/nielsmaneschijn/lotlr</a:t>
             </a:r>
           </a:p>
         </p:txBody>
@@ -6677,7 +7205,7 @@
           <a:p>
             <a:r>
               <a:rPr lang="nl-NL" dirty="0"/>
-              <a:t>Wrap-up</a:t>
+              <a:t>Aan de slag!</a:t>
             </a:r>
           </a:p>
           <a:p>
@@ -6688,7 +7216,7 @@
     </p:spTree>
     <p:extLst>
       <p:ext uri="{BB962C8B-B14F-4D97-AF65-F5344CB8AC3E}">
-        <p14:creationId xmlns:p14="http://schemas.microsoft.com/office/powerpoint/2010/main" val="2339396571"/>
+        <p14:creationId xmlns:p14="http://schemas.microsoft.com/office/powerpoint/2010/main" val="2214894094"/>
       </p:ext>
     </p:extLst>
   </p:cSld>
@@ -6715,10 +7243,176 @@
           <a:chExt cx="0" cy="0"/>
         </a:xfrm>
       </p:grpSpPr>
+      <p:sp>
+        <p:nvSpPr>
+          <p:cNvPr id="2" name="Tijdelijke aanduiding voor tekst 1"/>
+          <p:cNvSpPr>
+            <a:spLocks noGrp="1"/>
+          </p:cNvSpPr>
+          <p:nvPr>
+            <p:ph type="body" sz="quarter" idx="11"/>
+          </p:nvPr>
+        </p:nvSpPr>
+        <p:spPr>
+          <a:xfrm>
+            <a:off x="640403" y="1069975"/>
+            <a:ext cx="7735846" cy="4121150"/>
+          </a:xfrm>
+        </p:spPr>
+        <p:txBody>
+          <a:bodyPr/>
+          <a:lstStyle/>
+          <a:p>
+            <a:pPr marL="457200" indent="-457200">
+              <a:buFont typeface="Arial" panose="020B0604020202020204" pitchFamily="34" charset="0"/>
+              <a:buChar char="•"/>
+            </a:pPr>
+            <a:r>
+              <a:rPr lang="nl-NL" dirty="0"/>
+              <a:t>Home automation:</a:t>
+            </a:r>
+          </a:p>
+          <a:p>
+            <a:pPr marL="1200150" lvl="1" indent="-457200">
+              <a:buFont typeface="Arial" panose="020B0604020202020204" pitchFamily="34" charset="0"/>
+              <a:buChar char="•"/>
+            </a:pPr>
+            <a:r>
+              <a:rPr lang="nl-NL" dirty="0"/>
+              <a:t>MQTT</a:t>
+            </a:r>
+          </a:p>
+          <a:p>
+            <a:pPr marL="1200150" lvl="1" indent="-457200">
+              <a:buFont typeface="Arial" panose="020B0604020202020204" pitchFamily="34" charset="0"/>
+              <a:buChar char="•"/>
+            </a:pPr>
+            <a:r>
+              <a:rPr lang="nl-NL" dirty="0"/>
+              <a:t>Home Assistant</a:t>
+            </a:r>
+          </a:p>
+          <a:p>
+            <a:pPr marL="1200150" lvl="1" indent="-457200">
+              <a:buFont typeface="Arial" panose="020B0604020202020204" pitchFamily="34" charset="0"/>
+              <a:buChar char="•"/>
+            </a:pPr>
+            <a:r>
+              <a:rPr lang="nl-NL" dirty="0"/>
+              <a:t>Node Red</a:t>
+            </a:r>
+          </a:p>
+          <a:p>
+            <a:pPr marL="457200" indent="-457200">
+              <a:buFont typeface="Arial" panose="020B0604020202020204" pitchFamily="34" charset="0"/>
+              <a:buChar char="•"/>
+            </a:pPr>
+            <a:r>
+              <a:rPr lang="nl-NL" dirty="0"/>
+              <a:t>Sonoff</a:t>
+            </a:r>
+          </a:p>
+          <a:p>
+            <a:pPr marL="457200" indent="-457200">
+              <a:buFont typeface="Arial" panose="020B0604020202020204" pitchFamily="34" charset="0"/>
+              <a:buChar char="•"/>
+            </a:pPr>
+            <a:r>
+              <a:rPr lang="nl-NL" dirty="0"/>
+              <a:t>Standaard firmwares:</a:t>
+            </a:r>
+          </a:p>
+          <a:p>
+            <a:pPr marL="1200150" lvl="1" indent="-457200">
+              <a:buFont typeface="Arial" panose="020B0604020202020204" pitchFamily="34" charset="0"/>
+              <a:buChar char="•"/>
+            </a:pPr>
+            <a:r>
+              <a:rPr lang="nl-NL" dirty="0"/>
+              <a:t>Tasmota</a:t>
+            </a:r>
+          </a:p>
+          <a:p>
+            <a:pPr marL="1200150" lvl="1" indent="-457200">
+              <a:buFont typeface="Arial" panose="020B0604020202020204" pitchFamily="34" charset="0"/>
+              <a:buChar char="•"/>
+            </a:pPr>
+            <a:r>
+              <a:rPr lang="nl-NL" dirty="0"/>
+              <a:t>ESPEasy</a:t>
+            </a:r>
+          </a:p>
+          <a:p>
+            <a:pPr marL="457200" indent="-457200">
+              <a:buFont typeface="Arial" panose="020B0604020202020204" pitchFamily="34" charset="0"/>
+              <a:buChar char="•"/>
+            </a:pPr>
+            <a:r>
+              <a:rPr lang="nl-NL" dirty="0"/>
+              <a:t>Shoppen:</a:t>
+            </a:r>
+          </a:p>
+          <a:p>
+            <a:pPr marL="1200150" lvl="1" indent="-457200">
+              <a:buFont typeface="Arial" panose="020B0604020202020204" pitchFamily="34" charset="0"/>
+              <a:buChar char="•"/>
+            </a:pPr>
+            <a:r>
+              <a:rPr lang="nl-NL" dirty="0"/>
+              <a:t>banggood.com</a:t>
+            </a:r>
+          </a:p>
+          <a:p>
+            <a:pPr marL="1200150" lvl="1" indent="-457200">
+              <a:buFont typeface="Arial" panose="020B0604020202020204" pitchFamily="34" charset="0"/>
+              <a:buChar char="•"/>
+            </a:pPr>
+            <a:r>
+              <a:rPr lang="nl-NL" dirty="0"/>
+              <a:t>aliexpress.com</a:t>
+            </a:r>
+          </a:p>
+          <a:p>
+            <a:pPr marL="457200" indent="-457200">
+              <a:buFont typeface="Arial" panose="020B0604020202020204" pitchFamily="34" charset="0"/>
+              <a:buChar char="•"/>
+            </a:pPr>
+            <a:r>
+              <a:rPr lang="nl-NL" dirty="0"/>
+              <a:t>Watchdog timer: yield() of delay()</a:t>
+            </a:r>
+          </a:p>
+        </p:txBody>
+      </p:sp>
+      <p:sp>
+        <p:nvSpPr>
+          <p:cNvPr id="3" name="Tijdelijke aanduiding voor tekst 2"/>
+          <p:cNvSpPr>
+            <a:spLocks noGrp="1"/>
+          </p:cNvSpPr>
+          <p:nvPr>
+            <p:ph type="body" sz="quarter" idx="12"/>
+          </p:nvPr>
+        </p:nvSpPr>
+        <p:spPr/>
+        <p:txBody>
+          <a:bodyPr/>
+          <a:lstStyle/>
+          <a:p>
+            <a:r>
+              <a:rPr lang="nl-NL" dirty="0"/>
+              <a:t>Wrap-up</a:t>
+            </a:r>
+          </a:p>
+          <a:p>
+            <a:endParaRPr lang="nl-NL" dirty="0"/>
+          </a:p>
+        </p:txBody>
+      </p:sp>
     </p:spTree>
     <p:extLst>
       <p:ext uri="{BB962C8B-B14F-4D97-AF65-F5344CB8AC3E}">
-        <p14:creationId xmlns:p14="http://schemas.microsoft.com/office/powerpoint/2010/main" val="219317095"/>
+        <p14:creationId xmlns:p14="http://schemas.microsoft.com/office/powerpoint/2010/main" val="2339396571"/>
       </p:ext>
     </p:extLst>
   </p:cSld>

</xml_diff>